<commit_message>
ppt update slide of api and datastore
</commit_message>
<xml_diff>
--- a/ppt/FINAL YEAR PROJECT PPT UPDATED.pptx
+++ b/ppt/FINAL YEAR PROJECT PPT UPDATED.pptx
@@ -25,12 +25,13 @@
     <p:sldId id="280" r:id="rId19"/>
     <p:sldId id="281" r:id="rId20"/>
     <p:sldId id="289" r:id="rId21"/>
-    <p:sldId id="290" r:id="rId22"/>
-    <p:sldId id="291" r:id="rId23"/>
-    <p:sldId id="285" r:id="rId24"/>
-    <p:sldId id="286" r:id="rId25"/>
-    <p:sldId id="288" r:id="rId26"/>
-    <p:sldId id="270" r:id="rId27"/>
+    <p:sldId id="285" r:id="rId22"/>
+    <p:sldId id="290" r:id="rId23"/>
+    <p:sldId id="291" r:id="rId24"/>
+    <p:sldId id="292" r:id="rId25"/>
+    <p:sldId id="286" r:id="rId26"/>
+    <p:sldId id="288" r:id="rId27"/>
+    <p:sldId id="270" r:id="rId28"/>
   </p:sldIdLst>
   <p:sldSz cx="12192000" cy="6858000"/>
   <p:notesSz cx="6858000" cy="9144000"/>
@@ -270,7 +271,7 @@
           <a:p>
             <a:fld id="{48A87A34-81AB-432B-8DAE-1953F412C126}" type="datetimeFigureOut">
               <a:rPr lang="en-US" dirty="0"/>
-              <a:t>1/9/2022</a:t>
+              <a:t>1/10/2022</a:t>
             </a:fld>
             <a:endParaRPr lang="en-US" dirty="0"/>
           </a:p>
@@ -552,7 +553,7 @@
           <a:p>
             <a:fld id="{48A87A34-81AB-432B-8DAE-1953F412C126}" type="datetimeFigureOut">
               <a:rPr lang="en-US" dirty="0"/>
-              <a:t>1/9/2022</a:t>
+              <a:t>1/10/2022</a:t>
             </a:fld>
             <a:endParaRPr lang="en-US" dirty="0"/>
           </a:p>
@@ -739,7 +740,7 @@
           <a:p>
             <a:fld id="{48A87A34-81AB-432B-8DAE-1953F412C126}" type="datetimeFigureOut">
               <a:rPr lang="en-US" dirty="0"/>
-              <a:t>1/9/2022</a:t>
+              <a:t>1/10/2022</a:t>
             </a:fld>
             <a:endParaRPr lang="en-US" dirty="0"/>
           </a:p>
@@ -995,7 +996,7 @@
           <a:p>
             <a:fld id="{48A87A34-81AB-432B-8DAE-1953F412C126}" type="datetimeFigureOut">
               <a:rPr lang="en-US" dirty="0"/>
-              <a:t>1/9/2022</a:t>
+              <a:t>1/10/2022</a:t>
             </a:fld>
             <a:endParaRPr lang="en-US" dirty="0"/>
           </a:p>
@@ -1414,7 +1415,7 @@
           <a:p>
             <a:fld id="{48A87A34-81AB-432B-8DAE-1953F412C126}" type="datetimeFigureOut">
               <a:rPr lang="en-US" dirty="0"/>
-              <a:t>1/9/2022</a:t>
+              <a:t>1/10/2022</a:t>
             </a:fld>
             <a:endParaRPr lang="en-US" dirty="0"/>
           </a:p>
@@ -1955,7 +1956,7 @@
           <a:p>
             <a:fld id="{48A87A34-81AB-432B-8DAE-1953F412C126}" type="datetimeFigureOut">
               <a:rPr lang="en-US" dirty="0"/>
-              <a:t>1/9/2022</a:t>
+              <a:t>1/10/2022</a:t>
             </a:fld>
             <a:endParaRPr lang="en-US" dirty="0"/>
           </a:p>
@@ -2790,7 +2791,7 @@
           <a:p>
             <a:fld id="{48A87A34-81AB-432B-8DAE-1953F412C126}" type="datetimeFigureOut">
               <a:rPr lang="en-US" dirty="0"/>
-              <a:t>1/9/2022</a:t>
+              <a:t>1/10/2022</a:t>
             </a:fld>
             <a:endParaRPr lang="en-US" dirty="0"/>
           </a:p>
@@ -2955,7 +2956,7 @@
           <a:p>
             <a:fld id="{48A87A34-81AB-432B-8DAE-1953F412C126}" type="datetimeFigureOut">
               <a:rPr lang="en-US" dirty="0"/>
-              <a:t>1/9/2022</a:t>
+              <a:t>1/10/2022</a:t>
             </a:fld>
             <a:endParaRPr lang="en-US" dirty="0"/>
           </a:p>
@@ -3134,7 +3135,7 @@
           <a:p>
             <a:fld id="{48A87A34-81AB-432B-8DAE-1953F412C126}" type="datetimeFigureOut">
               <a:rPr lang="en-US" dirty="0"/>
-              <a:t>1/9/2022</a:t>
+              <a:t>1/10/2022</a:t>
             </a:fld>
             <a:endParaRPr lang="en-US" dirty="0"/>
           </a:p>
@@ -3299,7 +3300,7 @@
           <a:p>
             <a:fld id="{48A87A34-81AB-432B-8DAE-1953F412C126}" type="datetimeFigureOut">
               <a:rPr lang="en-US" dirty="0"/>
-              <a:t>1/9/2022</a:t>
+              <a:t>1/10/2022</a:t>
             </a:fld>
             <a:endParaRPr lang="en-US" dirty="0"/>
           </a:p>
@@ -3542,7 +3543,7 @@
           <a:p>
             <a:fld id="{48A87A34-81AB-432B-8DAE-1953F412C126}" type="datetimeFigureOut">
               <a:rPr lang="en-US" dirty="0"/>
-              <a:t>1/9/2022</a:t>
+              <a:t>1/10/2022</a:t>
             </a:fld>
             <a:endParaRPr lang="en-US" dirty="0"/>
           </a:p>
@@ -3774,7 +3775,7 @@
           <a:p>
             <a:fld id="{48A87A34-81AB-432B-8DAE-1953F412C126}" type="datetimeFigureOut">
               <a:rPr lang="en-US" dirty="0"/>
-              <a:t>1/9/2022</a:t>
+              <a:t>1/10/2022</a:t>
             </a:fld>
             <a:endParaRPr lang="en-US" dirty="0"/>
           </a:p>
@@ -4142,7 +4143,7 @@
           <a:p>
             <a:fld id="{48A87A34-81AB-432B-8DAE-1953F412C126}" type="datetimeFigureOut">
               <a:rPr lang="en-US" dirty="0"/>
-              <a:t>1/9/2022</a:t>
+              <a:t>1/10/2022</a:t>
             </a:fld>
             <a:endParaRPr lang="en-US" dirty="0"/>
           </a:p>
@@ -4255,7 +4256,7 @@
           <a:p>
             <a:fld id="{48A87A34-81AB-432B-8DAE-1953F412C126}" type="datetimeFigureOut">
               <a:rPr lang="en-US" dirty="0"/>
-              <a:t>1/9/2022</a:t>
+              <a:t>1/10/2022</a:t>
             </a:fld>
             <a:endParaRPr lang="en-US" dirty="0"/>
           </a:p>
@@ -4345,7 +4346,7 @@
           <a:p>
             <a:fld id="{48A87A34-81AB-432B-8DAE-1953F412C126}" type="datetimeFigureOut">
               <a:rPr lang="en-US" dirty="0"/>
-              <a:t>1/9/2022</a:t>
+              <a:t>1/10/2022</a:t>
             </a:fld>
             <a:endParaRPr lang="en-US" dirty="0"/>
           </a:p>
@@ -4591,7 +4592,7 @@
           <a:p>
             <a:fld id="{48A87A34-81AB-432B-8DAE-1953F412C126}" type="datetimeFigureOut">
               <a:rPr lang="en-US" dirty="0"/>
-              <a:t>1/9/2022</a:t>
+              <a:t>1/10/2022</a:t>
             </a:fld>
             <a:endParaRPr lang="en-US" dirty="0"/>
           </a:p>
@@ -4873,7 +4874,7 @@
           <a:p>
             <a:fld id="{48A87A34-81AB-432B-8DAE-1953F412C126}" type="datetimeFigureOut">
               <a:rPr lang="en-US" dirty="0"/>
-              <a:t>1/9/2022</a:t>
+              <a:t>1/10/2022</a:t>
             </a:fld>
             <a:endParaRPr lang="en-US" dirty="0"/>
           </a:p>
@@ -5082,7 +5083,7 @@
             <a:fld id="{48A87A34-81AB-432B-8DAE-1953F412C126}" type="datetimeFigureOut">
               <a:rPr lang="en-US" dirty="0"/>
               <a:pPr/>
-              <a:t>1/9/2022</a:t>
+              <a:t>1/10/2022</a:t>
             </a:fld>
             <a:endParaRPr lang="en-US" dirty="0"/>
           </a:p>
@@ -11060,7 +11061,7 @@
           <p:nvPr>
             <p:extLst>
               <p:ext uri="{D42A27DB-BD31-4B8C-83A1-F6EECF244321}">
-                <p14:modId xmlns:p14="http://schemas.microsoft.com/office/powerpoint/2010/main" val="390710041"/>
+                <p14:modId xmlns:p14="http://schemas.microsoft.com/office/powerpoint/2010/main" val="1626237933"/>
               </p:ext>
             </p:extLst>
           </p:nvPr>
@@ -11118,6 +11119,7 @@
                     <a:bodyPr/>
                     <a:lstStyle/>
                     <a:p>
+                      <a:pPr algn="ctr"/>
                       <a:r>
                         <a:rPr lang="en-US" b="0" dirty="0">
                           <a:solidFill>
@@ -11250,6 +11252,209 @@
           </a:graphicData>
         </a:graphic>
       </p:graphicFrame>
+      <p:graphicFrame>
+        <p:nvGraphicFramePr>
+          <p:cNvPr id="3" name="Table 3">
+            <a:extLst>
+              <a:ext uri="{FF2B5EF4-FFF2-40B4-BE49-F238E27FC236}">
+                <a16:creationId xmlns:a16="http://schemas.microsoft.com/office/drawing/2014/main" id="{DB58E983-5C6F-4892-9B02-FD49A3542926}"/>
+              </a:ext>
+            </a:extLst>
+          </p:cNvPr>
+          <p:cNvGraphicFramePr>
+            <a:graphicFrameLocks noGrp="1"/>
+          </p:cNvGraphicFramePr>
+          <p:nvPr>
+            <p:extLst>
+              <p:ext uri="{D42A27DB-BD31-4B8C-83A1-F6EECF244321}">
+                <p14:modId xmlns:p14="http://schemas.microsoft.com/office/powerpoint/2010/main" val="3052178236"/>
+              </p:ext>
+            </p:extLst>
+          </p:nvPr>
+        </p:nvGraphicFramePr>
+        <p:xfrm>
+          <a:off x="773130" y="6024616"/>
+          <a:ext cx="10645735" cy="544859"/>
+        </p:xfrm>
+        <a:graphic>
+          <a:graphicData uri="http://schemas.openxmlformats.org/drawingml/2006/table">
+            <a:tbl>
+              <a:tblPr firstRow="1" bandRow="1">
+                <a:tableStyleId>{5C22544A-7EE6-4342-B048-85BDC9FD1C3A}</a:tableStyleId>
+              </a:tblPr>
+              <a:tblGrid>
+                <a:gridCol w="2129147">
+                  <a:extLst>
+                    <a:ext uri="{9D8B030D-6E8A-4147-A177-3AD203B41FA5}">
+                      <a16:colId xmlns:a16="http://schemas.microsoft.com/office/drawing/2014/main" val="1025315034"/>
+                    </a:ext>
+                  </a:extLst>
+                </a:gridCol>
+                <a:gridCol w="2129147">
+                  <a:extLst>
+                    <a:ext uri="{9D8B030D-6E8A-4147-A177-3AD203B41FA5}">
+                      <a16:colId xmlns:a16="http://schemas.microsoft.com/office/drawing/2014/main" val="2426082376"/>
+                    </a:ext>
+                  </a:extLst>
+                </a:gridCol>
+                <a:gridCol w="2129147">
+                  <a:extLst>
+                    <a:ext uri="{9D8B030D-6E8A-4147-A177-3AD203B41FA5}">
+                      <a16:colId xmlns:a16="http://schemas.microsoft.com/office/drawing/2014/main" val="3867632442"/>
+                    </a:ext>
+                  </a:extLst>
+                </a:gridCol>
+                <a:gridCol w="2129147">
+                  <a:extLst>
+                    <a:ext uri="{9D8B030D-6E8A-4147-A177-3AD203B41FA5}">
+                      <a16:colId xmlns:a16="http://schemas.microsoft.com/office/drawing/2014/main" val="1803451257"/>
+                    </a:ext>
+                  </a:extLst>
+                </a:gridCol>
+                <a:gridCol w="2129147">
+                  <a:extLst>
+                    <a:ext uri="{9D8B030D-6E8A-4147-A177-3AD203B41FA5}">
+                      <a16:colId xmlns:a16="http://schemas.microsoft.com/office/drawing/2014/main" val="1554209135"/>
+                    </a:ext>
+                  </a:extLst>
+                </a:gridCol>
+              </a:tblGrid>
+              <a:tr h="544859">
+                <a:tc>
+                  <a:txBody>
+                    <a:bodyPr/>
+                    <a:lstStyle/>
+                    <a:p>
+                      <a:pPr algn="ctr"/>
+                      <a:r>
+                        <a:rPr lang="en-US" b="0" dirty="0">
+                          <a:solidFill>
+                            <a:schemeClr val="bg1"/>
+                          </a:solidFill>
+                        </a:rPr>
+                        <a:t>SIZE</a:t>
+                      </a:r>
+                    </a:p>
+                  </a:txBody>
+                  <a:tcPr>
+                    <a:solidFill>
+                      <a:schemeClr val="accent1">
+                        <a:lumMod val="40000"/>
+                        <a:lumOff val="60000"/>
+                      </a:schemeClr>
+                    </a:solidFill>
+                  </a:tcPr>
+                </a:tc>
+                <a:tc>
+                  <a:txBody>
+                    <a:bodyPr/>
+                    <a:lstStyle/>
+                    <a:p>
+                      <a:pPr algn="ctr"/>
+                      <a:r>
+                        <a:rPr lang="en-US" b="0" dirty="0">
+                          <a:solidFill>
+                            <a:schemeClr val="bg1"/>
+                          </a:solidFill>
+                        </a:rPr>
+                        <a:t>2.45 GB</a:t>
+                      </a:r>
+                    </a:p>
+                  </a:txBody>
+                  <a:tcPr>
+                    <a:solidFill>
+                      <a:schemeClr val="accent1">
+                        <a:lumMod val="40000"/>
+                        <a:lumOff val="60000"/>
+                      </a:schemeClr>
+                    </a:solidFill>
+                  </a:tcPr>
+                </a:tc>
+                <a:tc>
+                  <a:txBody>
+                    <a:bodyPr/>
+                    <a:lstStyle/>
+                    <a:p>
+                      <a:pPr algn="ctr"/>
+                      <a:r>
+                        <a:rPr lang="en-US" b="0" dirty="0">
+                          <a:solidFill>
+                            <a:schemeClr val="bg1"/>
+                          </a:solidFill>
+                        </a:rPr>
+                        <a:t>34.1 MB</a:t>
+                      </a:r>
+                    </a:p>
+                  </a:txBody>
+                  <a:tcPr>
+                    <a:solidFill>
+                      <a:schemeClr val="accent1">
+                        <a:lumMod val="40000"/>
+                        <a:lumOff val="60000"/>
+                      </a:schemeClr>
+                    </a:solidFill>
+                  </a:tcPr>
+                </a:tc>
+                <a:tc>
+                  <a:txBody>
+                    <a:bodyPr/>
+                    <a:lstStyle/>
+                    <a:p>
+                      <a:pPr algn="ctr"/>
+                      <a:r>
+                        <a:rPr lang="en-US" b="0" dirty="0">
+                          <a:solidFill>
+                            <a:schemeClr val="bg1"/>
+                          </a:solidFill>
+                        </a:rPr>
+                        <a:t>120 MB</a:t>
+                      </a:r>
+                    </a:p>
+                  </a:txBody>
+                  <a:tcPr>
+                    <a:solidFill>
+                      <a:schemeClr val="accent1">
+                        <a:lumMod val="40000"/>
+                        <a:lumOff val="60000"/>
+                      </a:schemeClr>
+                    </a:solidFill>
+                  </a:tcPr>
+                </a:tc>
+                <a:tc>
+                  <a:txBody>
+                    <a:bodyPr/>
+                    <a:lstStyle/>
+                    <a:p>
+                      <a:pPr algn="ctr"/>
+                      <a:r>
+                        <a:rPr lang="en-US" b="0" dirty="0">
+                          <a:solidFill>
+                            <a:schemeClr val="bg1"/>
+                          </a:solidFill>
+                        </a:rPr>
+                        <a:t>24.1 MB</a:t>
+                      </a:r>
+                    </a:p>
+                  </a:txBody>
+                  <a:tcPr>
+                    <a:solidFill>
+                      <a:schemeClr val="accent1">
+                        <a:lumMod val="40000"/>
+                        <a:lumOff val="60000"/>
+                      </a:schemeClr>
+                    </a:solidFill>
+                  </a:tcPr>
+                </a:tc>
+                <a:extLst>
+                  <a:ext uri="{0D108BD9-81ED-4DB2-BD59-A6C34878D82A}">
+                    <a16:rowId xmlns:a16="http://schemas.microsoft.com/office/drawing/2014/main" val="4116154915"/>
+                  </a:ext>
+                </a:extLst>
+              </a:tr>
+            </a:tbl>
+          </a:graphicData>
+        </a:graphic>
+      </p:graphicFrame>
     </p:spTree>
     <p:extLst>
       <p:ext uri="{BB962C8B-B14F-4D97-AF65-F5344CB8AC3E}">
@@ -11285,6 +11490,197 @@
           <p:cNvPr id="2" name="Title 1">
             <a:extLst>
               <a:ext uri="{FF2B5EF4-FFF2-40B4-BE49-F238E27FC236}">
+                <a16:creationId xmlns:a16="http://schemas.microsoft.com/office/drawing/2014/main" id="{5317CBAF-5557-447B-BABE-D9543F1D7EC6}"/>
+              </a:ext>
+            </a:extLst>
+          </p:cNvPr>
+          <p:cNvSpPr>
+            <a:spLocks noGrp="1"/>
+          </p:cNvSpPr>
+          <p:nvPr>
+            <p:ph type="title"/>
+          </p:nvPr>
+        </p:nvSpPr>
+        <p:spPr>
+          <a:xfrm>
+            <a:off x="919119" y="5120250"/>
+            <a:ext cx="10353761" cy="535618"/>
+          </a:xfrm>
+        </p:spPr>
+        <p:txBody>
+          <a:bodyPr>
+            <a:normAutofit/>
+          </a:bodyPr>
+          <a:lstStyle/>
+          <a:p>
+            <a:r>
+              <a:rPr lang="en-US" sz="2400" b="0" dirty="0">
+                <a:effectLst/>
+                <a:latin typeface="+mn-lt"/>
+              </a:rPr>
+              <a:t>SCHEMA OF DATABASE</a:t>
+            </a:r>
+          </a:p>
+        </p:txBody>
+      </p:sp>
+      <p:pic>
+        <p:nvPicPr>
+          <p:cNvPr id="6" name="Picture 5">
+            <a:extLst>
+              <a:ext uri="{FF2B5EF4-FFF2-40B4-BE49-F238E27FC236}">
+                <a16:creationId xmlns:a16="http://schemas.microsoft.com/office/drawing/2014/main" id="{42751E69-5F73-4741-9675-A105C303CF78}"/>
+              </a:ext>
+            </a:extLst>
+          </p:cNvPr>
+          <p:cNvPicPr>
+            <a:picLocks noChangeAspect="1"/>
+          </p:cNvPicPr>
+          <p:nvPr/>
+        </p:nvPicPr>
+        <p:blipFill>
+          <a:blip r:embed="rId2"/>
+          <a:stretch>
+            <a:fillRect/>
+          </a:stretch>
+        </p:blipFill>
+        <p:spPr>
+          <a:xfrm>
+            <a:off x="431255" y="1862408"/>
+            <a:ext cx="6972722" cy="2972069"/>
+          </a:xfrm>
+          <a:prstGeom prst="rect">
+            <a:avLst/>
+          </a:prstGeom>
+        </p:spPr>
+      </p:pic>
+      <p:pic>
+        <p:nvPicPr>
+          <p:cNvPr id="8" name="Picture 7">
+            <a:extLst>
+              <a:ext uri="{FF2B5EF4-FFF2-40B4-BE49-F238E27FC236}">
+                <a16:creationId xmlns:a16="http://schemas.microsoft.com/office/drawing/2014/main" id="{6ACA8283-280D-47D8-AAA6-64849ECCDB7E}"/>
+              </a:ext>
+            </a:extLst>
+          </p:cNvPr>
+          <p:cNvPicPr>
+            <a:picLocks noChangeAspect="1"/>
+          </p:cNvPicPr>
+          <p:nvPr/>
+        </p:nvPicPr>
+        <p:blipFill>
+          <a:blip r:embed="rId3"/>
+          <a:stretch>
+            <a:fillRect/>
+          </a:stretch>
+        </p:blipFill>
+        <p:spPr>
+          <a:xfrm>
+            <a:off x="7403977" y="1847348"/>
+            <a:ext cx="4303504" cy="2987129"/>
+          </a:xfrm>
+          <a:prstGeom prst="rect">
+            <a:avLst/>
+          </a:prstGeom>
+        </p:spPr>
+      </p:pic>
+      <p:sp>
+        <p:nvSpPr>
+          <p:cNvPr id="7" name="Title 1">
+            <a:extLst>
+              <a:ext uri="{FF2B5EF4-FFF2-40B4-BE49-F238E27FC236}">
+                <a16:creationId xmlns:a16="http://schemas.microsoft.com/office/drawing/2014/main" id="{6178F9FB-8A13-478C-895B-5ACFA4848C96}"/>
+              </a:ext>
+            </a:extLst>
+          </p:cNvPr>
+          <p:cNvSpPr txBox="1">
+            <a:spLocks/>
+          </p:cNvSpPr>
+          <p:nvPr/>
+        </p:nvSpPr>
+        <p:spPr>
+          <a:xfrm>
+            <a:off x="919119" y="265702"/>
+            <a:ext cx="10353761" cy="535618"/>
+          </a:xfrm>
+          <a:prstGeom prst="rect">
+            <a:avLst/>
+          </a:prstGeom>
+        </p:spPr>
+        <p:txBody>
+          <a:bodyPr vert="horz" lIns="91440" tIns="45720" rIns="91440" bIns="45720" rtlCol="0" anchor="ctr">
+            <a:normAutofit fontScale="97500" lnSpcReduction="10000"/>
+          </a:bodyPr>
+          <a:lstStyle>
+            <a:lvl1pPr algn="ctr" defTabSz="914400" rtl="0" eaLnBrk="1" latinLnBrk="0" hangingPunct="1">
+              <a:lnSpc>
+                <a:spcPct val="90000"/>
+              </a:lnSpc>
+              <a:spcBef>
+                <a:spcPct val="0"/>
+              </a:spcBef>
+              <a:buNone/>
+              <a:defRPr sz="3400" b="1" i="0" kern="1200" cap="all">
+                <a:solidFill>
+                  <a:schemeClr val="tx1"/>
+                </a:solidFill>
+                <a:effectLst>
+                  <a:outerShdw blurRad="50800" dist="63500" dir="2700000" algn="tl" rotWithShape="0">
+                    <a:srgbClr val="000000">
+                      <a:alpha val="48000"/>
+                    </a:srgbClr>
+                  </a:outerShdw>
+                </a:effectLst>
+                <a:latin typeface="+mj-lt"/>
+                <a:ea typeface="+mj-ea"/>
+                <a:cs typeface="+mj-cs"/>
+              </a:defRPr>
+            </a:lvl1pPr>
+          </a:lstStyle>
+          <a:p>
+            <a:r>
+              <a:rPr lang="en-US" u="sng" dirty="0">
+                <a:latin typeface="Algerian" panose="04020705040A02060702" pitchFamily="82" charset="0"/>
+              </a:rPr>
+              <a:t>IBM CLOUD DATABASE</a:t>
+            </a:r>
+          </a:p>
+        </p:txBody>
+      </p:sp>
+    </p:spTree>
+    <p:extLst>
+      <p:ext uri="{BB962C8B-B14F-4D97-AF65-F5344CB8AC3E}">
+        <p14:creationId xmlns:p14="http://schemas.microsoft.com/office/powerpoint/2010/main" val="3543400605"/>
+      </p:ext>
+    </p:extLst>
+  </p:cSld>
+  <p:clrMapOvr>
+    <a:masterClrMapping/>
+  </p:clrMapOvr>
+</p:sld>
+</file>
+
+<file path=ppt/slides/slide22.xml><?xml version="1.0" encoding="utf-8"?>
+<p:sld xmlns:a="http://schemas.openxmlformats.org/drawingml/2006/main" xmlns:r="http://schemas.openxmlformats.org/officeDocument/2006/relationships" xmlns:p="http://schemas.openxmlformats.org/presentationml/2006/main">
+  <p:cSld>
+    <p:spTree>
+      <p:nvGrpSpPr>
+        <p:cNvPr id="1" name=""/>
+        <p:cNvGrpSpPr/>
+        <p:nvPr/>
+      </p:nvGrpSpPr>
+      <p:grpSpPr>
+        <a:xfrm>
+          <a:off x="0" y="0"/>
+          <a:ext cx="0" cy="0"/>
+          <a:chOff x="0" y="0"/>
+          <a:chExt cx="0" cy="0"/>
+        </a:xfrm>
+      </p:grpSpPr>
+      <p:sp>
+        <p:nvSpPr>
+          <p:cNvPr id="2" name="Title 1">
+            <a:extLst>
+              <a:ext uri="{FF2B5EF4-FFF2-40B4-BE49-F238E27FC236}">
                 <a16:creationId xmlns:a16="http://schemas.microsoft.com/office/drawing/2014/main" id="{2BCF6536-C660-4101-BBCF-AEAAF1C0A391}"/>
               </a:ext>
             </a:extLst>
@@ -11298,7 +11694,7 @@
         </p:nvSpPr>
         <p:spPr>
           <a:xfrm>
-            <a:off x="999018" y="1073089"/>
+            <a:off x="919119" y="620328"/>
             <a:ext cx="10353761" cy="535618"/>
           </a:xfrm>
         </p:spPr>
@@ -11309,10 +11705,10 @@
           <a:lstStyle/>
           <a:p>
             <a:r>
-              <a:rPr lang="en-US" dirty="0">
+              <a:rPr lang="en-US" u="sng" dirty="0">
                 <a:latin typeface="Algerian" panose="04020705040A02060702" pitchFamily="82" charset="0"/>
               </a:rPr>
-              <a:t>IBM CLOUD DATABASE</a:t>
+              <a:t>DATA STORE</a:t>
             </a:r>
           </a:p>
         </p:txBody>
@@ -11499,81 +11895,6 @@
           </a:p>
         </p:txBody>
       </p:sp>
-      <p:sp>
-        <p:nvSpPr>
-          <p:cNvPr id="10" name="Title 1">
-            <a:extLst>
-              <a:ext uri="{FF2B5EF4-FFF2-40B4-BE49-F238E27FC236}">
-                <a16:creationId xmlns:a16="http://schemas.microsoft.com/office/drawing/2014/main" id="{0CD0709D-504D-4A01-BF7E-CEE76AD687B4}"/>
-              </a:ext>
-            </a:extLst>
-          </p:cNvPr>
-          <p:cNvSpPr txBox="1">
-            <a:spLocks/>
-          </p:cNvSpPr>
-          <p:nvPr/>
-        </p:nvSpPr>
-        <p:spPr>
-          <a:xfrm>
-            <a:off x="919119" y="371384"/>
-            <a:ext cx="10353761" cy="535618"/>
-          </a:xfrm>
-          <a:prstGeom prst="rect">
-            <a:avLst/>
-          </a:prstGeom>
-        </p:spPr>
-        <p:txBody>
-          <a:bodyPr vert="horz" lIns="91440" tIns="45720" rIns="91440" bIns="45720" rtlCol="0" anchor="ctr">
-            <a:normAutofit fontScale="97500" lnSpcReduction="10000"/>
-          </a:bodyPr>
-          <a:lstStyle>
-            <a:lvl1pPr algn="ctr" defTabSz="914400" rtl="0" eaLnBrk="1" latinLnBrk="0" hangingPunct="1">
-              <a:lnSpc>
-                <a:spcPct val="90000"/>
-              </a:lnSpc>
-              <a:spcBef>
-                <a:spcPct val="0"/>
-              </a:spcBef>
-              <a:buNone/>
-              <a:defRPr sz="3400" b="1" i="0" kern="1200" cap="all">
-                <a:solidFill>
-                  <a:schemeClr val="tx1"/>
-                </a:solidFill>
-                <a:effectLst>
-                  <a:outerShdw blurRad="50800" dist="63500" dir="2700000" algn="tl" rotWithShape="0">
-                    <a:srgbClr val="000000">
-                      <a:alpha val="48000"/>
-                    </a:srgbClr>
-                  </a:outerShdw>
-                </a:effectLst>
-                <a:latin typeface="+mj-lt"/>
-                <a:ea typeface="+mj-ea"/>
-                <a:cs typeface="+mj-cs"/>
-              </a:defRPr>
-            </a:lvl1pPr>
-          </a:lstStyle>
-          <a:p>
-            <a:r>
-              <a:rPr lang="en-US" u="sng" dirty="0">
-                <a:latin typeface="Algerian" panose="04020705040A02060702" pitchFamily="82" charset="0"/>
-              </a:rPr>
-              <a:t>2</a:t>
-            </a:r>
-            <a:r>
-              <a:rPr lang="en-US" u="sng" baseline="30000" dirty="0">
-                <a:latin typeface="Algerian" panose="04020705040A02060702" pitchFamily="82" charset="0"/>
-              </a:rPr>
-              <a:t>nd</a:t>
-            </a:r>
-            <a:r>
-              <a:rPr lang="en-US" u="sng" dirty="0">
-                <a:latin typeface="Algerian" panose="04020705040A02060702" pitchFamily="82" charset="0"/>
-              </a:rPr>
-              <a:t> part work</a:t>
-            </a:r>
-          </a:p>
-        </p:txBody>
-      </p:sp>
     </p:spTree>
     <p:extLst>
       <p:ext uri="{BB962C8B-B14F-4D97-AF65-F5344CB8AC3E}">
@@ -11587,7 +11908,7 @@
 </p:sld>
 </file>
 
-<file path=ppt/slides/slide22.xml><?xml version="1.0" encoding="utf-8"?>
+<file path=ppt/slides/slide23.xml><?xml version="1.0" encoding="utf-8"?>
 <p:sld xmlns:a="http://schemas.openxmlformats.org/drawingml/2006/main" xmlns:r="http://schemas.openxmlformats.org/officeDocument/2006/relationships" xmlns:p="http://schemas.openxmlformats.org/presentationml/2006/main">
   <p:cSld>
     <p:spTree>
@@ -11712,413 +12033,6 @@
 </p:sld>
 </file>
 
-<file path=ppt/slides/slide23.xml><?xml version="1.0" encoding="utf-8"?>
-<p:sld xmlns:a="http://schemas.openxmlformats.org/drawingml/2006/main" xmlns:r="http://schemas.openxmlformats.org/officeDocument/2006/relationships" xmlns:p="http://schemas.openxmlformats.org/presentationml/2006/main">
-  <p:cSld>
-    <p:spTree>
-      <p:nvGrpSpPr>
-        <p:cNvPr id="1" name=""/>
-        <p:cNvGrpSpPr/>
-        <p:nvPr/>
-      </p:nvGrpSpPr>
-      <p:grpSpPr>
-        <a:xfrm>
-          <a:off x="0" y="0"/>
-          <a:ext cx="0" cy="0"/>
-          <a:chOff x="0" y="0"/>
-          <a:chExt cx="0" cy="0"/>
-        </a:xfrm>
-      </p:grpSpPr>
-      <p:sp>
-        <p:nvSpPr>
-          <p:cNvPr id="2" name="Title 1">
-            <a:extLst>
-              <a:ext uri="{FF2B5EF4-FFF2-40B4-BE49-F238E27FC236}">
-                <a16:creationId xmlns:a16="http://schemas.microsoft.com/office/drawing/2014/main" id="{5317CBAF-5557-447B-BABE-D9543F1D7EC6}"/>
-              </a:ext>
-            </a:extLst>
-          </p:cNvPr>
-          <p:cNvSpPr>
-            <a:spLocks noGrp="1"/>
-          </p:cNvSpPr>
-          <p:nvPr>
-            <p:ph type="title"/>
-          </p:nvPr>
-        </p:nvSpPr>
-        <p:spPr>
-          <a:xfrm>
-            <a:off x="919119" y="757063"/>
-            <a:ext cx="10353761" cy="624395"/>
-          </a:xfrm>
-        </p:spPr>
-        <p:txBody>
-          <a:bodyPr/>
-          <a:lstStyle/>
-          <a:p>
-            <a:r>
-              <a:rPr lang="en-US" b="0" u="sng" dirty="0">
-                <a:latin typeface="Algerian" panose="04020705040A02060702" pitchFamily="82" charset="0"/>
-              </a:rPr>
-              <a:t>2</a:t>
-            </a:r>
-            <a:r>
-              <a:rPr lang="en-US" b="0" u="sng" baseline="30000" dirty="0">
-                <a:latin typeface="Algerian" panose="04020705040A02060702" pitchFamily="82" charset="0"/>
-              </a:rPr>
-              <a:t>nd</a:t>
-            </a:r>
-            <a:r>
-              <a:rPr lang="en-US" b="0" u="sng" dirty="0">
-                <a:latin typeface="Algerian" panose="04020705040A02060702" pitchFamily="82" charset="0"/>
-              </a:rPr>
-              <a:t> part</a:t>
-            </a:r>
-          </a:p>
-        </p:txBody>
-      </p:sp>
-      <p:sp>
-        <p:nvSpPr>
-          <p:cNvPr id="3" name="Content Placeholder 2">
-            <a:extLst>
-              <a:ext uri="{FF2B5EF4-FFF2-40B4-BE49-F238E27FC236}">
-                <a16:creationId xmlns:a16="http://schemas.microsoft.com/office/drawing/2014/main" id="{0C6D8B55-6773-43B2-B9CB-55038E73347D}"/>
-              </a:ext>
-            </a:extLst>
-          </p:cNvPr>
-          <p:cNvSpPr txBox="1">
-            <a:spLocks/>
-          </p:cNvSpPr>
-          <p:nvPr/>
-        </p:nvSpPr>
-        <p:spPr>
-          <a:xfrm>
-            <a:off x="772337" y="5171982"/>
-            <a:ext cx="10647326" cy="501588"/>
-          </a:xfrm>
-          <a:prstGeom prst="rect">
-            <a:avLst/>
-          </a:prstGeom>
-        </p:spPr>
-        <p:txBody>
-          <a:bodyPr/>
-          <a:lstStyle>
-            <a:lvl1pPr marL="228600" indent="-228600" algn="l" defTabSz="914400" rtl="0" eaLnBrk="1" latinLnBrk="0" hangingPunct="1">
-              <a:lnSpc>
-                <a:spcPct val="120000"/>
-              </a:lnSpc>
-              <a:spcBef>
-                <a:spcPts val="1000"/>
-              </a:spcBef>
-              <a:buFont typeface="Arial" panose="020B0604020202020204" pitchFamily="34" charset="0"/>
-              <a:buChar char="•"/>
-              <a:defRPr sz="2000" kern="1200">
-                <a:solidFill>
-                  <a:schemeClr val="tx1"/>
-                </a:solidFill>
-                <a:effectLst>
-                  <a:outerShdw blurRad="50800" dist="38100" dir="2700000" algn="tl" rotWithShape="0">
-                    <a:srgbClr val="000000">
-                      <a:alpha val="48000"/>
-                    </a:srgbClr>
-                  </a:outerShdw>
-                </a:effectLst>
-                <a:latin typeface="+mn-lt"/>
-                <a:ea typeface="+mn-ea"/>
-                <a:cs typeface="+mn-cs"/>
-              </a:defRPr>
-            </a:lvl1pPr>
-            <a:lvl2pPr marL="685800" indent="-228600" algn="l" defTabSz="914400" rtl="0" eaLnBrk="1" latinLnBrk="0" hangingPunct="1">
-              <a:lnSpc>
-                <a:spcPct val="120000"/>
-              </a:lnSpc>
-              <a:spcBef>
-                <a:spcPts val="500"/>
-              </a:spcBef>
-              <a:buFont typeface="Arial" panose="020B0604020202020204" pitchFamily="34" charset="0"/>
-              <a:buChar char="•"/>
-              <a:defRPr sz="1800" kern="1200">
-                <a:solidFill>
-                  <a:schemeClr val="tx1"/>
-                </a:solidFill>
-                <a:effectLst>
-                  <a:outerShdw blurRad="50800" dist="38100" dir="2700000" algn="tl" rotWithShape="0">
-                    <a:srgbClr val="000000">
-                      <a:alpha val="48000"/>
-                    </a:srgbClr>
-                  </a:outerShdw>
-                </a:effectLst>
-                <a:latin typeface="+mn-lt"/>
-                <a:ea typeface="+mn-ea"/>
-                <a:cs typeface="+mn-cs"/>
-              </a:defRPr>
-            </a:lvl2pPr>
-            <a:lvl3pPr marL="1143000" indent="-228600" algn="l" defTabSz="914400" rtl="0" eaLnBrk="1" latinLnBrk="0" hangingPunct="1">
-              <a:lnSpc>
-                <a:spcPct val="120000"/>
-              </a:lnSpc>
-              <a:spcBef>
-                <a:spcPts val="500"/>
-              </a:spcBef>
-              <a:buFont typeface="Arial" panose="020B0604020202020204" pitchFamily="34" charset="0"/>
-              <a:buChar char="•"/>
-              <a:defRPr sz="1600" kern="1200">
-                <a:solidFill>
-                  <a:schemeClr val="tx1"/>
-                </a:solidFill>
-                <a:effectLst>
-                  <a:outerShdw blurRad="50800" dist="38100" dir="2700000" algn="tl" rotWithShape="0">
-                    <a:srgbClr val="000000">
-                      <a:alpha val="48000"/>
-                    </a:srgbClr>
-                  </a:outerShdw>
-                </a:effectLst>
-                <a:latin typeface="+mn-lt"/>
-                <a:ea typeface="+mn-ea"/>
-                <a:cs typeface="+mn-cs"/>
-              </a:defRPr>
-            </a:lvl3pPr>
-            <a:lvl4pPr marL="1600200" indent="-228600" algn="l" defTabSz="914400" rtl="0" eaLnBrk="1" latinLnBrk="0" hangingPunct="1">
-              <a:lnSpc>
-                <a:spcPct val="120000"/>
-              </a:lnSpc>
-              <a:spcBef>
-                <a:spcPts val="500"/>
-              </a:spcBef>
-              <a:buFont typeface="Arial" panose="020B0604020202020204" pitchFamily="34" charset="0"/>
-              <a:buChar char="•"/>
-              <a:defRPr sz="1400" kern="1200">
-                <a:solidFill>
-                  <a:schemeClr val="tx1"/>
-                </a:solidFill>
-                <a:effectLst>
-                  <a:outerShdw blurRad="50800" dist="38100" dir="2700000" algn="tl" rotWithShape="0">
-                    <a:srgbClr val="000000">
-                      <a:alpha val="48000"/>
-                    </a:srgbClr>
-                  </a:outerShdw>
-                </a:effectLst>
-                <a:latin typeface="+mn-lt"/>
-                <a:ea typeface="+mn-ea"/>
-                <a:cs typeface="+mn-cs"/>
-              </a:defRPr>
-            </a:lvl4pPr>
-            <a:lvl5pPr marL="2057400" indent="-228600" algn="l" defTabSz="914400" rtl="0" eaLnBrk="1" latinLnBrk="0" hangingPunct="1">
-              <a:lnSpc>
-                <a:spcPct val="120000"/>
-              </a:lnSpc>
-              <a:spcBef>
-                <a:spcPts val="500"/>
-              </a:spcBef>
-              <a:buFont typeface="Arial" panose="020B0604020202020204" pitchFamily="34" charset="0"/>
-              <a:buChar char="•"/>
-              <a:defRPr sz="1200" kern="1200">
-                <a:solidFill>
-                  <a:schemeClr val="tx1"/>
-                </a:solidFill>
-                <a:effectLst>
-                  <a:outerShdw blurRad="50800" dist="38100" dir="2700000" algn="tl" rotWithShape="0">
-                    <a:srgbClr val="000000">
-                      <a:alpha val="48000"/>
-                    </a:srgbClr>
-                  </a:outerShdw>
-                </a:effectLst>
-                <a:latin typeface="+mn-lt"/>
-                <a:ea typeface="+mn-ea"/>
-                <a:cs typeface="+mn-cs"/>
-              </a:defRPr>
-            </a:lvl5pPr>
-            <a:lvl6pPr marL="2514600" indent="-228600" algn="l" defTabSz="914400" rtl="0" eaLnBrk="1" latinLnBrk="0" hangingPunct="1">
-              <a:lnSpc>
-                <a:spcPct val="120000"/>
-              </a:lnSpc>
-              <a:spcBef>
-                <a:spcPts val="500"/>
-              </a:spcBef>
-              <a:buFont typeface="Arial" panose="020B0604020202020204" pitchFamily="34" charset="0"/>
-              <a:buChar char="•"/>
-              <a:defRPr sz="1200" kern="1200">
-                <a:solidFill>
-                  <a:schemeClr val="tx1"/>
-                </a:solidFill>
-                <a:effectLst>
-                  <a:outerShdw blurRad="50800" dist="38100" dir="2700000" algn="tl" rotWithShape="0">
-                    <a:srgbClr val="000000">
-                      <a:alpha val="48000"/>
-                    </a:srgbClr>
-                  </a:outerShdw>
-                </a:effectLst>
-                <a:latin typeface="+mn-lt"/>
-                <a:ea typeface="+mn-ea"/>
-                <a:cs typeface="+mn-cs"/>
-              </a:defRPr>
-            </a:lvl6pPr>
-            <a:lvl7pPr marL="2971800" indent="-228600" algn="l" defTabSz="914400" rtl="0" eaLnBrk="1" latinLnBrk="0" hangingPunct="1">
-              <a:lnSpc>
-                <a:spcPct val="120000"/>
-              </a:lnSpc>
-              <a:spcBef>
-                <a:spcPts val="500"/>
-              </a:spcBef>
-              <a:buFont typeface="Arial" panose="020B0604020202020204" pitchFamily="34" charset="0"/>
-              <a:buChar char="•"/>
-              <a:defRPr sz="1200" kern="1200">
-                <a:solidFill>
-                  <a:schemeClr val="tx1"/>
-                </a:solidFill>
-                <a:effectLst>
-                  <a:outerShdw blurRad="50800" dist="38100" dir="2700000" algn="tl" rotWithShape="0">
-                    <a:srgbClr val="000000">
-                      <a:alpha val="48000"/>
-                    </a:srgbClr>
-                  </a:outerShdw>
-                </a:effectLst>
-                <a:latin typeface="+mn-lt"/>
-                <a:ea typeface="+mn-ea"/>
-                <a:cs typeface="+mn-cs"/>
-              </a:defRPr>
-            </a:lvl7pPr>
-            <a:lvl8pPr marL="3429000" indent="-228600" algn="l" defTabSz="914400" rtl="0" eaLnBrk="1" latinLnBrk="0" hangingPunct="1">
-              <a:lnSpc>
-                <a:spcPct val="120000"/>
-              </a:lnSpc>
-              <a:spcBef>
-                <a:spcPts val="500"/>
-              </a:spcBef>
-              <a:buFont typeface="Arial" panose="020B0604020202020204" pitchFamily="34" charset="0"/>
-              <a:buChar char="•"/>
-              <a:defRPr sz="1200" kern="1200">
-                <a:solidFill>
-                  <a:schemeClr val="tx1"/>
-                </a:solidFill>
-                <a:effectLst>
-                  <a:outerShdw blurRad="50800" dist="38100" dir="2700000" algn="tl" rotWithShape="0">
-                    <a:srgbClr val="000000">
-                      <a:alpha val="48000"/>
-                    </a:srgbClr>
-                  </a:outerShdw>
-                </a:effectLst>
-                <a:latin typeface="+mn-lt"/>
-                <a:ea typeface="+mn-ea"/>
-                <a:cs typeface="+mn-cs"/>
-              </a:defRPr>
-            </a:lvl8pPr>
-            <a:lvl9pPr marL="3886200" indent="-228600" algn="l" defTabSz="914400" rtl="0" eaLnBrk="1" latinLnBrk="0" hangingPunct="1">
-              <a:lnSpc>
-                <a:spcPct val="120000"/>
-              </a:lnSpc>
-              <a:spcBef>
-                <a:spcPts val="500"/>
-              </a:spcBef>
-              <a:buFont typeface="Arial" panose="020B0604020202020204" pitchFamily="34" charset="0"/>
-              <a:buChar char="•"/>
-              <a:defRPr sz="1200" kern="1200">
-                <a:solidFill>
-                  <a:schemeClr val="tx1"/>
-                </a:solidFill>
-                <a:effectLst>
-                  <a:outerShdw blurRad="50800" dist="38100" dir="2700000" algn="tl" rotWithShape="0">
-                    <a:srgbClr val="000000">
-                      <a:alpha val="48000"/>
-                    </a:srgbClr>
-                  </a:outerShdw>
-                </a:effectLst>
-                <a:latin typeface="+mn-lt"/>
-                <a:ea typeface="+mn-ea"/>
-                <a:cs typeface="+mn-cs"/>
-              </a:defRPr>
-            </a:lvl9pPr>
-          </a:lstStyle>
-          <a:p>
-            <a:pPr marL="0" indent="0" algn="ctr">
-              <a:buNone/>
-            </a:pPr>
-            <a:r>
-              <a:rPr lang="en-US" dirty="0">
-                <a:effectLst/>
-                <a:latin typeface="Rockwell" panose="02060603020205020403" pitchFamily="18" charset="0"/>
-              </a:rPr>
-              <a:t>WORK IN PROGRESS</a:t>
-            </a:r>
-            <a:endParaRPr lang="en-US" i="0" u="sng" dirty="0">
-              <a:effectLst/>
-              <a:latin typeface="Rockwell" panose="02060603020205020403" pitchFamily="18" charset="0"/>
-            </a:endParaRPr>
-          </a:p>
-        </p:txBody>
-      </p:sp>
-      <p:pic>
-        <p:nvPicPr>
-          <p:cNvPr id="6" name="Picture 5">
-            <a:extLst>
-              <a:ext uri="{FF2B5EF4-FFF2-40B4-BE49-F238E27FC236}">
-                <a16:creationId xmlns:a16="http://schemas.microsoft.com/office/drawing/2014/main" id="{42751E69-5F73-4741-9675-A105C303CF78}"/>
-              </a:ext>
-            </a:extLst>
-          </p:cNvPr>
-          <p:cNvPicPr>
-            <a:picLocks noChangeAspect="1"/>
-          </p:cNvPicPr>
-          <p:nvPr/>
-        </p:nvPicPr>
-        <p:blipFill>
-          <a:blip r:embed="rId2"/>
-          <a:stretch>
-            <a:fillRect/>
-          </a:stretch>
-        </p:blipFill>
-        <p:spPr>
-          <a:xfrm>
-            <a:off x="431255" y="1862408"/>
-            <a:ext cx="6972722" cy="2972069"/>
-          </a:xfrm>
-          <a:prstGeom prst="rect">
-            <a:avLst/>
-          </a:prstGeom>
-        </p:spPr>
-      </p:pic>
-      <p:pic>
-        <p:nvPicPr>
-          <p:cNvPr id="8" name="Picture 7">
-            <a:extLst>
-              <a:ext uri="{FF2B5EF4-FFF2-40B4-BE49-F238E27FC236}">
-                <a16:creationId xmlns:a16="http://schemas.microsoft.com/office/drawing/2014/main" id="{6ACA8283-280D-47D8-AAA6-64849ECCDB7E}"/>
-              </a:ext>
-            </a:extLst>
-          </p:cNvPr>
-          <p:cNvPicPr>
-            <a:picLocks noChangeAspect="1"/>
-          </p:cNvPicPr>
-          <p:nvPr/>
-        </p:nvPicPr>
-        <p:blipFill>
-          <a:blip r:embed="rId3"/>
-          <a:stretch>
-            <a:fillRect/>
-          </a:stretch>
-        </p:blipFill>
-        <p:spPr>
-          <a:xfrm>
-            <a:off x="7403977" y="1847348"/>
-            <a:ext cx="4303504" cy="2987129"/>
-          </a:xfrm>
-          <a:prstGeom prst="rect">
-            <a:avLst/>
-          </a:prstGeom>
-        </p:spPr>
-      </p:pic>
-    </p:spTree>
-    <p:extLst>
-      <p:ext uri="{BB962C8B-B14F-4D97-AF65-F5344CB8AC3E}">
-        <p14:creationId xmlns:p14="http://schemas.microsoft.com/office/powerpoint/2010/main" val="3543400605"/>
-      </p:ext>
-    </p:extLst>
-  </p:cSld>
-  <p:clrMapOvr>
-    <a:masterClrMapping/>
-  </p:clrMapOvr>
-</p:sld>
-</file>
-
 <file path=ppt/slides/slide24.xml><?xml version="1.0" encoding="utf-8"?>
 <p:sld xmlns:a="http://schemas.openxmlformats.org/drawingml/2006/main" xmlns:r="http://schemas.openxmlformats.org/officeDocument/2006/relationships" xmlns:p="http://schemas.openxmlformats.org/presentationml/2006/main">
   <p:cSld>
@@ -12141,49 +12055,7 @@
           <p:cNvPr id="3" name="Title 1">
             <a:extLst>
               <a:ext uri="{FF2B5EF4-FFF2-40B4-BE49-F238E27FC236}">
-                <a16:creationId xmlns:a16="http://schemas.microsoft.com/office/drawing/2014/main" id="{C50EBF56-810D-4F98-9993-0AFA11FF4633}"/>
-              </a:ext>
-            </a:extLst>
-          </p:cNvPr>
-          <p:cNvSpPr>
-            <a:spLocks noGrp="1"/>
-          </p:cNvSpPr>
-          <p:nvPr>
-            <p:ph type="title"/>
-          </p:nvPr>
-        </p:nvSpPr>
-        <p:spPr>
-          <a:xfrm>
-            <a:off x="862007" y="1811046"/>
-            <a:ext cx="10353761" cy="2796465"/>
-          </a:xfrm>
-        </p:spPr>
-        <p:txBody>
-          <a:bodyPr anchor="t">
-            <a:normAutofit fontScale="90000"/>
-          </a:bodyPr>
-          <a:lstStyle/>
-          <a:p>
-            <a:pPr algn="just">
-              <a:lnSpc>
-                <a:spcPct val="150000"/>
-              </a:lnSpc>
-            </a:pPr>
-            <a:r>
-              <a:rPr lang="en-US" sz="2000" b="0" dirty="0">
-                <a:latin typeface="Rockwell" panose="02060603020205020403" pitchFamily="18" charset="0"/>
-              </a:rPr>
-              <a:t>Upto the first part of our project , RES NET Architecture can successfully predict the face wearing a mask or not. Raw Data is collected through the camera, then pre-processing raw data using openCV is converted into usable data and then is fed into the models.   The various architectures used are  DENSE NET, MOBILE NET,  RES NET. Since, RES NET Architecture is giving us 99% accuracy, so this particular model is preferred.</a:t>
-            </a:r>
-          </a:p>
-        </p:txBody>
-      </p:sp>
-      <p:sp>
-        <p:nvSpPr>
-          <p:cNvPr id="4" name="Title 1">
-            <a:extLst>
-              <a:ext uri="{FF2B5EF4-FFF2-40B4-BE49-F238E27FC236}">
-                <a16:creationId xmlns:a16="http://schemas.microsoft.com/office/drawing/2014/main" id="{62330BCB-AF3E-4DEB-ACAD-58AEB9782577}"/>
+                <a16:creationId xmlns:a16="http://schemas.microsoft.com/office/drawing/2014/main" id="{5B7586FF-2ADE-42BC-BA33-CDB9C248A6A7}"/>
               </a:ext>
             </a:extLst>
           </p:cNvPr>
@@ -12194,16 +12066,16 @@
         </p:nvSpPr>
         <p:spPr>
           <a:xfrm>
-            <a:off x="862007" y="828582"/>
-            <a:ext cx="10353761" cy="624395"/>
+            <a:off x="919119" y="1276905"/>
+            <a:ext cx="10353761" cy="392097"/>
           </a:xfrm>
           <a:prstGeom prst="rect">
             <a:avLst/>
           </a:prstGeom>
         </p:spPr>
         <p:txBody>
-          <a:bodyPr vert="horz" lIns="91440" tIns="45720" rIns="91440" bIns="45720" rtlCol="0" anchor="ctr">
-            <a:normAutofit/>
+          <a:bodyPr vert="horz" lIns="91440" tIns="45720" rIns="91440" bIns="45720" rtlCol="0" anchor="t">
+            <a:normAutofit fontScale="97500"/>
           </a:bodyPr>
           <a:lstStyle>
             <a:lvl1pPr algn="ctr" defTabSz="914400" rtl="0" eaLnBrk="1" latinLnBrk="0" hangingPunct="1">
@@ -12233,18 +12105,118 @@
           </a:lstStyle>
           <a:p>
             <a:r>
-              <a:rPr lang="en-US" b="0" u="sng" dirty="0">
+              <a:rPr lang="en-US" sz="2000" b="0" dirty="0">
+                <a:effectLst/>
+                <a:latin typeface="+mn-lt"/>
+              </a:rPr>
+              <a:t>INTEGRATING API INTO OUR APPLICATION</a:t>
+            </a:r>
+            <a:r>
+              <a:rPr lang="en-US" sz="2000" dirty="0">
+                <a:latin typeface="+mn-lt"/>
+              </a:rPr>
+              <a:t> </a:t>
+            </a:r>
+          </a:p>
+        </p:txBody>
+      </p:sp>
+      <p:sp>
+        <p:nvSpPr>
+          <p:cNvPr id="4" name="Title 1">
+            <a:extLst>
+              <a:ext uri="{FF2B5EF4-FFF2-40B4-BE49-F238E27FC236}">
+                <a16:creationId xmlns:a16="http://schemas.microsoft.com/office/drawing/2014/main" id="{5A5C4E90-D77E-44A3-B318-D7E6ED1C326E}"/>
+              </a:ext>
+            </a:extLst>
+          </p:cNvPr>
+          <p:cNvSpPr txBox="1">
+            <a:spLocks/>
+          </p:cNvSpPr>
+          <p:nvPr/>
+        </p:nvSpPr>
+        <p:spPr>
+          <a:xfrm>
+            <a:off x="919119" y="371384"/>
+            <a:ext cx="10353761" cy="535618"/>
+          </a:xfrm>
+          <a:prstGeom prst="rect">
+            <a:avLst/>
+          </a:prstGeom>
+        </p:spPr>
+        <p:txBody>
+          <a:bodyPr vert="horz" lIns="91440" tIns="45720" rIns="91440" bIns="45720" rtlCol="0" anchor="ctr">
+            <a:normAutofit fontScale="97500" lnSpcReduction="10000"/>
+          </a:bodyPr>
+          <a:lstStyle>
+            <a:lvl1pPr algn="ctr" defTabSz="914400" rtl="0" eaLnBrk="1" latinLnBrk="0" hangingPunct="1">
+              <a:lnSpc>
+                <a:spcPct val="90000"/>
+              </a:lnSpc>
+              <a:spcBef>
+                <a:spcPct val="0"/>
+              </a:spcBef>
+              <a:buNone/>
+              <a:defRPr sz="3400" b="1" i="0" kern="1200" cap="all">
+                <a:solidFill>
+                  <a:schemeClr val="tx1"/>
+                </a:solidFill>
+                <a:effectLst>
+                  <a:outerShdw blurRad="50800" dist="63500" dir="2700000" algn="tl" rotWithShape="0">
+                    <a:srgbClr val="000000">
+                      <a:alpha val="48000"/>
+                    </a:srgbClr>
+                  </a:outerShdw>
+                </a:effectLst>
+                <a:latin typeface="+mj-lt"/>
+                <a:ea typeface="+mj-ea"/>
+                <a:cs typeface="+mj-cs"/>
+              </a:defRPr>
+            </a:lvl1pPr>
+          </a:lstStyle>
+          <a:p>
+            <a:r>
+              <a:rPr lang="en-US" u="sng" dirty="0">
                 <a:latin typeface="Algerian" panose="04020705040A02060702" pitchFamily="82" charset="0"/>
               </a:rPr>
-              <a:t>CONCLUSION</a:t>
-            </a:r>
-          </a:p>
-        </p:txBody>
-      </p:sp>
+              <a:t>WORK IN PROGRESS</a:t>
+            </a:r>
+          </a:p>
+        </p:txBody>
+      </p:sp>
+      <p:pic>
+        <p:nvPicPr>
+          <p:cNvPr id="6" name="Picture 5">
+            <a:extLst>
+              <a:ext uri="{FF2B5EF4-FFF2-40B4-BE49-F238E27FC236}">
+                <a16:creationId xmlns:a16="http://schemas.microsoft.com/office/drawing/2014/main" id="{68152166-FDE5-42BF-AB93-971D0A180214}"/>
+              </a:ext>
+            </a:extLst>
+          </p:cNvPr>
+          <p:cNvPicPr>
+            <a:picLocks noChangeAspect="1"/>
+          </p:cNvPicPr>
+          <p:nvPr/>
+        </p:nvPicPr>
+        <p:blipFill>
+          <a:blip r:embed="rId2"/>
+          <a:stretch>
+            <a:fillRect/>
+          </a:stretch>
+        </p:blipFill>
+        <p:spPr>
+          <a:xfrm>
+            <a:off x="1349407" y="1735886"/>
+            <a:ext cx="9650026" cy="4333479"/>
+          </a:xfrm>
+          <a:prstGeom prst="rect">
+            <a:avLst/>
+          </a:prstGeom>
+        </p:spPr>
+      </p:pic>
     </p:spTree>
     <p:extLst>
       <p:ext uri="{BB962C8B-B14F-4D97-AF65-F5344CB8AC3E}">
-        <p14:creationId xmlns:p14="http://schemas.microsoft.com/office/powerpoint/2010/main" val="3665601651"/>
+        <p14:creationId xmlns:p14="http://schemas.microsoft.com/office/powerpoint/2010/main" val="3897564896"/>
       </p:ext>
     </p:extLst>
   </p:cSld>
@@ -12276,6 +12248,141 @@
           <p:cNvPr id="3" name="Title 1">
             <a:extLst>
               <a:ext uri="{FF2B5EF4-FFF2-40B4-BE49-F238E27FC236}">
+                <a16:creationId xmlns:a16="http://schemas.microsoft.com/office/drawing/2014/main" id="{C50EBF56-810D-4F98-9993-0AFA11FF4633}"/>
+              </a:ext>
+            </a:extLst>
+          </p:cNvPr>
+          <p:cNvSpPr>
+            <a:spLocks noGrp="1"/>
+          </p:cNvSpPr>
+          <p:nvPr>
+            <p:ph type="title"/>
+          </p:nvPr>
+        </p:nvSpPr>
+        <p:spPr>
+          <a:xfrm>
+            <a:off x="862007" y="1811046"/>
+            <a:ext cx="10353761" cy="2796465"/>
+          </a:xfrm>
+        </p:spPr>
+        <p:txBody>
+          <a:bodyPr anchor="t">
+            <a:normAutofit fontScale="90000"/>
+          </a:bodyPr>
+          <a:lstStyle/>
+          <a:p>
+            <a:pPr algn="just">
+              <a:lnSpc>
+                <a:spcPct val="150000"/>
+              </a:lnSpc>
+            </a:pPr>
+            <a:r>
+              <a:rPr lang="en-US" sz="2000" b="0" dirty="0">
+                <a:latin typeface="Rockwell" panose="02060603020205020403" pitchFamily="18" charset="0"/>
+              </a:rPr>
+              <a:t>Upto the first part of our project , RES NET Architecture can successfully predict the face wearing a mask or not. Raw Data is collected through the camera, then pre-processing raw data using openCV is converted into usable data and then is fed into the models.   The various architectures used are  DENSE NET, MOBILE NET,  RES NET. Since, RES NET Architecture is giving us 99% accuracy, so this particular model is preferred.</a:t>
+            </a:r>
+          </a:p>
+        </p:txBody>
+      </p:sp>
+      <p:sp>
+        <p:nvSpPr>
+          <p:cNvPr id="4" name="Title 1">
+            <a:extLst>
+              <a:ext uri="{FF2B5EF4-FFF2-40B4-BE49-F238E27FC236}">
+                <a16:creationId xmlns:a16="http://schemas.microsoft.com/office/drawing/2014/main" id="{62330BCB-AF3E-4DEB-ACAD-58AEB9782577}"/>
+              </a:ext>
+            </a:extLst>
+          </p:cNvPr>
+          <p:cNvSpPr txBox="1">
+            <a:spLocks/>
+          </p:cNvSpPr>
+          <p:nvPr/>
+        </p:nvSpPr>
+        <p:spPr>
+          <a:xfrm>
+            <a:off x="862007" y="828582"/>
+            <a:ext cx="10353761" cy="624395"/>
+          </a:xfrm>
+          <a:prstGeom prst="rect">
+            <a:avLst/>
+          </a:prstGeom>
+        </p:spPr>
+        <p:txBody>
+          <a:bodyPr vert="horz" lIns="91440" tIns="45720" rIns="91440" bIns="45720" rtlCol="0" anchor="ctr">
+            <a:normAutofit/>
+          </a:bodyPr>
+          <a:lstStyle>
+            <a:lvl1pPr algn="ctr" defTabSz="914400" rtl="0" eaLnBrk="1" latinLnBrk="0" hangingPunct="1">
+              <a:lnSpc>
+                <a:spcPct val="90000"/>
+              </a:lnSpc>
+              <a:spcBef>
+                <a:spcPct val="0"/>
+              </a:spcBef>
+              <a:buNone/>
+              <a:defRPr sz="3400" b="1" i="0" kern="1200" cap="all">
+                <a:solidFill>
+                  <a:schemeClr val="tx1"/>
+                </a:solidFill>
+                <a:effectLst>
+                  <a:outerShdw blurRad="50800" dist="63500" dir="2700000" algn="tl" rotWithShape="0">
+                    <a:srgbClr val="000000">
+                      <a:alpha val="48000"/>
+                    </a:srgbClr>
+                  </a:outerShdw>
+                </a:effectLst>
+                <a:latin typeface="+mj-lt"/>
+                <a:ea typeface="+mj-ea"/>
+                <a:cs typeface="+mj-cs"/>
+              </a:defRPr>
+            </a:lvl1pPr>
+          </a:lstStyle>
+          <a:p>
+            <a:r>
+              <a:rPr lang="en-US" b="0" u="sng" dirty="0">
+                <a:latin typeface="Algerian" panose="04020705040A02060702" pitchFamily="82" charset="0"/>
+              </a:rPr>
+              <a:t>CONCLUSION</a:t>
+            </a:r>
+          </a:p>
+        </p:txBody>
+      </p:sp>
+    </p:spTree>
+    <p:extLst>
+      <p:ext uri="{BB962C8B-B14F-4D97-AF65-F5344CB8AC3E}">
+        <p14:creationId xmlns:p14="http://schemas.microsoft.com/office/powerpoint/2010/main" val="3665601651"/>
+      </p:ext>
+    </p:extLst>
+  </p:cSld>
+  <p:clrMapOvr>
+    <a:masterClrMapping/>
+  </p:clrMapOvr>
+</p:sld>
+</file>
+
+<file path=ppt/slides/slide26.xml><?xml version="1.0" encoding="utf-8"?>
+<p:sld xmlns:a="http://schemas.openxmlformats.org/drawingml/2006/main" xmlns:r="http://schemas.openxmlformats.org/officeDocument/2006/relationships" xmlns:p="http://schemas.openxmlformats.org/presentationml/2006/main">
+  <p:cSld>
+    <p:spTree>
+      <p:nvGrpSpPr>
+        <p:cNvPr id="1" name=""/>
+        <p:cNvGrpSpPr/>
+        <p:nvPr/>
+      </p:nvGrpSpPr>
+      <p:grpSpPr>
+        <a:xfrm>
+          <a:off x="0" y="0"/>
+          <a:ext cx="0" cy="0"/>
+          <a:chOff x="0" y="0"/>
+          <a:chExt cx="0" cy="0"/>
+        </a:xfrm>
+      </p:grpSpPr>
+      <p:sp>
+        <p:nvSpPr>
+          <p:cNvPr id="3" name="Title 1">
+            <a:extLst>
+              <a:ext uri="{FF2B5EF4-FFF2-40B4-BE49-F238E27FC236}">
                 <a16:creationId xmlns:a16="http://schemas.microsoft.com/office/drawing/2014/main" id="{A2831796-ABD0-451F-A4EA-B257010F3F74}"/>
               </a:ext>
             </a:extLst>
@@ -12954,7 +13061,7 @@
 </p:sld>
 </file>
 
-<file path=ppt/slides/slide26.xml><?xml version="1.0" encoding="utf-8"?>
+<file path=ppt/slides/slide27.xml><?xml version="1.0" encoding="utf-8"?>
 <p:sld xmlns:a="http://schemas.openxmlformats.org/drawingml/2006/main" xmlns:r="http://schemas.openxmlformats.org/officeDocument/2006/relationships" xmlns:p="http://schemas.openxmlformats.org/presentationml/2006/main">
   <p:cSld>
     <p:spTree>

</xml_diff>